<commit_message>
MWW: various minor wordsmithing fixes.
</commit_message>
<xml_diff>
--- a/doc/NFM_2018/Presentation1.pptx
+++ b/doc/NFM_2018/Presentation1.pptx
@@ -106,6 +106,11 @@
       </a:defRPr>
     </a:lvl9pPr>
   </p:defaultTextStyle>
+  <p:extLst>
+    <p:ext uri="{EFAFB233-063F-42B5-8137-9DF3F51BA10A}">
+      <p15:sldGuideLst xmlns:p15="http://schemas.microsoft.com/office/powerpoint/2012/main"/>
+    </p:ext>
+  </p:extLst>
 </p:presentation>
 </file>
 
@@ -240,7 +245,7 @@
           <a:p>
             <a:fld id="{6B888DAE-3304-4C13-A116-D5EDC2A059AC}" type="datetimeFigureOut">
               <a:rPr lang="en-US" smtClean="0"/>
-              <a:t>12/5/2017</a:t>
+              <a:t>12/7/2017</a:t>
             </a:fld>
             <a:endParaRPr lang="en-US"/>
           </a:p>
@@ -410,7 +415,7 @@
           <a:p>
             <a:fld id="{6B888DAE-3304-4C13-A116-D5EDC2A059AC}" type="datetimeFigureOut">
               <a:rPr lang="en-US" smtClean="0"/>
-              <a:t>12/5/2017</a:t>
+              <a:t>12/7/2017</a:t>
             </a:fld>
             <a:endParaRPr lang="en-US"/>
           </a:p>
@@ -590,7 +595,7 @@
           <a:p>
             <a:fld id="{6B888DAE-3304-4C13-A116-D5EDC2A059AC}" type="datetimeFigureOut">
               <a:rPr lang="en-US" smtClean="0"/>
-              <a:t>12/5/2017</a:t>
+              <a:t>12/7/2017</a:t>
             </a:fld>
             <a:endParaRPr lang="en-US"/>
           </a:p>
@@ -760,7 +765,7 @@
           <a:p>
             <a:fld id="{6B888DAE-3304-4C13-A116-D5EDC2A059AC}" type="datetimeFigureOut">
               <a:rPr lang="en-US" smtClean="0"/>
-              <a:t>12/5/2017</a:t>
+              <a:t>12/7/2017</a:t>
             </a:fld>
             <a:endParaRPr lang="en-US"/>
           </a:p>
@@ -1006,7 +1011,7 @@
           <a:p>
             <a:fld id="{6B888DAE-3304-4C13-A116-D5EDC2A059AC}" type="datetimeFigureOut">
               <a:rPr lang="en-US" smtClean="0"/>
-              <a:t>12/5/2017</a:t>
+              <a:t>12/7/2017</a:t>
             </a:fld>
             <a:endParaRPr lang="en-US"/>
           </a:p>
@@ -1238,7 +1243,7 @@
           <a:p>
             <a:fld id="{6B888DAE-3304-4C13-A116-D5EDC2A059AC}" type="datetimeFigureOut">
               <a:rPr lang="en-US" smtClean="0"/>
-              <a:t>12/5/2017</a:t>
+              <a:t>12/7/2017</a:t>
             </a:fld>
             <a:endParaRPr lang="en-US"/>
           </a:p>
@@ -1605,7 +1610,7 @@
           <a:p>
             <a:fld id="{6B888DAE-3304-4C13-A116-D5EDC2A059AC}" type="datetimeFigureOut">
               <a:rPr lang="en-US" smtClean="0"/>
-              <a:t>12/5/2017</a:t>
+              <a:t>12/7/2017</a:t>
             </a:fld>
             <a:endParaRPr lang="en-US"/>
           </a:p>
@@ -1723,7 +1728,7 @@
           <a:p>
             <a:fld id="{6B888DAE-3304-4C13-A116-D5EDC2A059AC}" type="datetimeFigureOut">
               <a:rPr lang="en-US" smtClean="0"/>
-              <a:t>12/5/2017</a:t>
+              <a:t>12/7/2017</a:t>
             </a:fld>
             <a:endParaRPr lang="en-US"/>
           </a:p>
@@ -1818,7 +1823,7 @@
           <a:p>
             <a:fld id="{6B888DAE-3304-4C13-A116-D5EDC2A059AC}" type="datetimeFigureOut">
               <a:rPr lang="en-US" smtClean="0"/>
-              <a:t>12/5/2017</a:t>
+              <a:t>12/7/2017</a:t>
             </a:fld>
             <a:endParaRPr lang="en-US"/>
           </a:p>
@@ -2095,7 +2100,7 @@
           <a:p>
             <a:fld id="{6B888DAE-3304-4C13-A116-D5EDC2A059AC}" type="datetimeFigureOut">
               <a:rPr lang="en-US" smtClean="0"/>
-              <a:t>12/5/2017</a:t>
+              <a:t>12/7/2017</a:t>
             </a:fld>
             <a:endParaRPr lang="en-US"/>
           </a:p>
@@ -2348,7 +2353,7 @@
           <a:p>
             <a:fld id="{6B888DAE-3304-4C13-A116-D5EDC2A059AC}" type="datetimeFigureOut">
               <a:rPr lang="en-US" smtClean="0"/>
-              <a:t>12/5/2017</a:t>
+              <a:t>12/7/2017</a:t>
             </a:fld>
             <a:endParaRPr lang="en-US"/>
           </a:p>
@@ -2561,7 +2566,7 @@
           <a:p>
             <a:fld id="{6B888DAE-3304-4C13-A116-D5EDC2A059AC}" type="datetimeFigureOut">
               <a:rPr lang="en-US" smtClean="0"/>
-              <a:t>12/5/2017</a:t>
+              <a:t>12/7/2017</a:t>
             </a:fld>
             <a:endParaRPr lang="en-US"/>
           </a:p>
@@ -4639,16 +4644,10 @@
           </a:p>
           <a:p>
             <a:r>
-              <a:rPr lang="en-US" sz="1200" smtClean="0">
-                <a:latin typeface="Consolas" panose="020B0609020204030204" pitchFamily="49" charset="0"/>
-              </a:rPr>
-              <a:t>  </a:t>
-            </a:r>
-            <a:r>
               <a:rPr lang="en-US" sz="1200" dirty="0" smtClean="0">
                 <a:latin typeface="Consolas" panose="020B0609020204030204" pitchFamily="49" charset="0"/>
               </a:rPr>
-              <a:t>green_pump__fault_22__node__val_out = </a:t>
+              <a:t>  green_pump__fault_22__node__val_out = </a:t>
             </a:r>
           </a:p>
           <a:p>
@@ -4656,13 +4655,19 @@
               <a:rPr lang="en-US" sz="1200" dirty="0" smtClean="0">
                 <a:latin typeface="Consolas" panose="020B0609020204030204" pitchFamily="49" charset="0"/>
               </a:rPr>
-              <a:t>	faults__</a:t>
+              <a:t>	faults</a:t>
+            </a:r>
+            <a:r>
+              <a:rPr lang="en-US" sz="1200" dirty="0" smtClean="0">
+                <a:latin typeface="Consolas" panose="020B0609020204030204" pitchFamily="49" charset="0"/>
+              </a:rPr>
+              <a:t>__</a:t>
             </a:r>
             <a:r>
               <a:rPr lang="en-US" sz="1200" dirty="0" err="1" smtClean="0">
                 <a:latin typeface="Consolas" panose="020B0609020204030204" pitchFamily="49" charset="0"/>
               </a:rPr>
-              <a:t>pressure_fail_to</a:t>
+              <a:t>fail_to</a:t>
             </a:r>
             <a:r>
               <a:rPr lang="en-US" sz="1200" dirty="0" smtClean="0">

</xml_diff>

<commit_message>
Edits to figs 1 and 2
</commit_message>
<xml_diff>
--- a/doc/NFM_2018/Presentation1.pptx
+++ b/doc/NFM_2018/Presentation1.pptx
@@ -108,7 +108,7 @@
   </p:defaultTextStyle>
   <p:extLst>
     <p:ext uri="{EFAFB233-063F-42B5-8137-9DF3F51BA10A}">
-      <p15:sldGuideLst xmlns:p15="http://schemas.microsoft.com/office/powerpoint/2012/main"/>
+      <p15:sldGuideLst xmlns:p15="http://schemas.microsoft.com/office/powerpoint/2012/main" xmlns=""/>
     </p:ext>
   </p:extLst>
 </p:presentation>
@@ -245,7 +245,7 @@
           <a:p>
             <a:fld id="{6B888DAE-3304-4C13-A116-D5EDC2A059AC}" type="datetimeFigureOut">
               <a:rPr lang="en-US" smtClean="0"/>
-              <a:t>12/7/2017</a:t>
+              <a:t>12/8/2017</a:t>
             </a:fld>
             <a:endParaRPr lang="en-US"/>
           </a:p>
@@ -415,7 +415,7 @@
           <a:p>
             <a:fld id="{6B888DAE-3304-4C13-A116-D5EDC2A059AC}" type="datetimeFigureOut">
               <a:rPr lang="en-US" smtClean="0"/>
-              <a:t>12/7/2017</a:t>
+              <a:t>12/8/2017</a:t>
             </a:fld>
             <a:endParaRPr lang="en-US"/>
           </a:p>
@@ -595,7 +595,7 @@
           <a:p>
             <a:fld id="{6B888DAE-3304-4C13-A116-D5EDC2A059AC}" type="datetimeFigureOut">
               <a:rPr lang="en-US" smtClean="0"/>
-              <a:t>12/7/2017</a:t>
+              <a:t>12/8/2017</a:t>
             </a:fld>
             <a:endParaRPr lang="en-US"/>
           </a:p>
@@ -765,7 +765,7 @@
           <a:p>
             <a:fld id="{6B888DAE-3304-4C13-A116-D5EDC2A059AC}" type="datetimeFigureOut">
               <a:rPr lang="en-US" smtClean="0"/>
-              <a:t>12/7/2017</a:t>
+              <a:t>12/8/2017</a:t>
             </a:fld>
             <a:endParaRPr lang="en-US"/>
           </a:p>
@@ -1011,7 +1011,7 @@
           <a:p>
             <a:fld id="{6B888DAE-3304-4C13-A116-D5EDC2A059AC}" type="datetimeFigureOut">
               <a:rPr lang="en-US" smtClean="0"/>
-              <a:t>12/7/2017</a:t>
+              <a:t>12/8/2017</a:t>
             </a:fld>
             <a:endParaRPr lang="en-US"/>
           </a:p>
@@ -1243,7 +1243,7 @@
           <a:p>
             <a:fld id="{6B888DAE-3304-4C13-A116-D5EDC2A059AC}" type="datetimeFigureOut">
               <a:rPr lang="en-US" smtClean="0"/>
-              <a:t>12/7/2017</a:t>
+              <a:t>12/8/2017</a:t>
             </a:fld>
             <a:endParaRPr lang="en-US"/>
           </a:p>
@@ -1610,7 +1610,7 @@
           <a:p>
             <a:fld id="{6B888DAE-3304-4C13-A116-D5EDC2A059AC}" type="datetimeFigureOut">
               <a:rPr lang="en-US" smtClean="0"/>
-              <a:t>12/7/2017</a:t>
+              <a:t>12/8/2017</a:t>
             </a:fld>
             <a:endParaRPr lang="en-US"/>
           </a:p>
@@ -1728,7 +1728,7 @@
           <a:p>
             <a:fld id="{6B888DAE-3304-4C13-A116-D5EDC2A059AC}" type="datetimeFigureOut">
               <a:rPr lang="en-US" smtClean="0"/>
-              <a:t>12/7/2017</a:t>
+              <a:t>12/8/2017</a:t>
             </a:fld>
             <a:endParaRPr lang="en-US"/>
           </a:p>
@@ -1823,7 +1823,7 @@
           <a:p>
             <a:fld id="{6B888DAE-3304-4C13-A116-D5EDC2A059AC}" type="datetimeFigureOut">
               <a:rPr lang="en-US" smtClean="0"/>
-              <a:t>12/7/2017</a:t>
+              <a:t>12/8/2017</a:t>
             </a:fld>
             <a:endParaRPr lang="en-US"/>
           </a:p>
@@ -2100,7 +2100,7 @@
           <a:p>
             <a:fld id="{6B888DAE-3304-4C13-A116-D5EDC2A059AC}" type="datetimeFigureOut">
               <a:rPr lang="en-US" smtClean="0"/>
-              <a:t>12/7/2017</a:t>
+              <a:t>12/8/2017</a:t>
             </a:fld>
             <a:endParaRPr lang="en-US"/>
           </a:p>
@@ -2353,7 +2353,7 @@
           <a:p>
             <a:fld id="{6B888DAE-3304-4C13-A116-D5EDC2A059AC}" type="datetimeFigureOut">
               <a:rPr lang="en-US" smtClean="0"/>
-              <a:t>12/7/2017</a:t>
+              <a:t>12/8/2017</a:t>
             </a:fld>
             <a:endParaRPr lang="en-US"/>
           </a:p>
@@ -2566,7 +2566,7 @@
           <a:p>
             <a:fld id="{6B888DAE-3304-4C13-A116-D5EDC2A059AC}" type="datetimeFigureOut">
               <a:rPr lang="en-US" smtClean="0"/>
-              <a:t>12/7/2017</a:t>
+              <a:t>12/8/2017</a:t>
             </a:fld>
             <a:endParaRPr lang="en-US"/>
           </a:p>
@@ -3222,145 +3222,13 @@
       </p:grpSp>
       <p:sp>
         <p:nvSpPr>
-          <p:cNvPr id="10" name="Rectangle 9"/>
-          <p:cNvSpPr/>
-          <p:nvPr/>
-        </p:nvSpPr>
-        <p:spPr>
-          <a:xfrm>
-            <a:off x="1724507" y="581806"/>
-            <a:ext cx="830984" cy="383664"/>
-          </a:xfrm>
-          <a:prstGeom prst="rect">
-            <a:avLst/>
-          </a:prstGeom>
-          <a:noFill/>
-          <a:ln w="6350">
-            <a:solidFill>
-              <a:schemeClr val="tx1"/>
-            </a:solidFill>
-          </a:ln>
-          <a:effectLst>
-            <a:glow rad="63500">
-              <a:schemeClr val="accent3">
-                <a:satMod val="175000"/>
-                <a:alpha val="40000"/>
-              </a:schemeClr>
-            </a:glow>
-          </a:effectLst>
-        </p:spPr>
-        <p:style>
-          <a:lnRef idx="2">
-            <a:schemeClr val="accent1">
-              <a:shade val="50000"/>
-            </a:schemeClr>
-          </a:lnRef>
-          <a:fillRef idx="1">
-            <a:schemeClr val="accent1"/>
-          </a:fillRef>
-          <a:effectRef idx="0">
-            <a:schemeClr val="accent1"/>
-          </a:effectRef>
-          <a:fontRef idx="minor">
-            <a:schemeClr val="lt1"/>
-          </a:fontRef>
-        </p:style>
-        <p:txBody>
-          <a:bodyPr rtlCol="0" anchor="ctr"/>
-          <a:lstStyle/>
-          <a:p>
-            <a:pPr algn="ctr"/>
-            <a:r>
-              <a:rPr lang="en-US" sz="900" dirty="0" smtClean="0">
-                <a:solidFill>
-                  <a:schemeClr val="tx1"/>
-                </a:solidFill>
-              </a:rPr>
-              <a:t>AGREE Parser</a:t>
-            </a:r>
-            <a:endParaRPr lang="en-US" sz="900" dirty="0">
-              <a:solidFill>
-                <a:schemeClr val="tx1"/>
-              </a:solidFill>
-            </a:endParaRPr>
-          </a:p>
-        </p:txBody>
-      </p:sp>
-      <p:sp>
-        <p:nvSpPr>
-          <p:cNvPr id="11" name="Rectangle 10"/>
-          <p:cNvSpPr/>
-          <p:nvPr/>
-        </p:nvSpPr>
-        <p:spPr>
-          <a:xfrm>
-            <a:off x="1729544" y="1314657"/>
-            <a:ext cx="825945" cy="383664"/>
-          </a:xfrm>
-          <a:prstGeom prst="rect">
-            <a:avLst/>
-          </a:prstGeom>
-          <a:noFill/>
-          <a:ln w="6350">
-            <a:solidFill>
-              <a:schemeClr val="tx1"/>
-            </a:solidFill>
-          </a:ln>
-          <a:effectLst>
-            <a:glow rad="63500">
-              <a:schemeClr val="accent3">
-                <a:satMod val="175000"/>
-                <a:alpha val="40000"/>
-              </a:schemeClr>
-            </a:glow>
-          </a:effectLst>
-        </p:spPr>
-        <p:style>
-          <a:lnRef idx="2">
-            <a:schemeClr val="accent1">
-              <a:shade val="50000"/>
-            </a:schemeClr>
-          </a:lnRef>
-          <a:fillRef idx="1">
-            <a:schemeClr val="accent1"/>
-          </a:fillRef>
-          <a:effectRef idx="0">
-            <a:schemeClr val="accent1"/>
-          </a:effectRef>
-          <a:fontRef idx="minor">
-            <a:schemeClr val="lt1"/>
-          </a:fontRef>
-        </p:style>
-        <p:txBody>
-          <a:bodyPr rtlCol="0" anchor="ctr"/>
-          <a:lstStyle/>
-          <a:p>
-            <a:pPr algn="ctr"/>
-            <a:r>
-              <a:rPr lang="en-US" sz="900" dirty="0" smtClean="0">
-                <a:solidFill>
-                  <a:schemeClr val="tx1"/>
-                </a:solidFill>
-              </a:rPr>
-              <a:t>Safety Parser</a:t>
-            </a:r>
-            <a:endParaRPr lang="en-US" sz="900" dirty="0">
-              <a:solidFill>
-                <a:schemeClr val="tx1"/>
-              </a:solidFill>
-            </a:endParaRPr>
-          </a:p>
-        </p:txBody>
-      </p:sp>
-      <p:sp>
-        <p:nvSpPr>
           <p:cNvPr id="12" name="Rectangle 11"/>
           <p:cNvSpPr/>
           <p:nvPr/>
         </p:nvSpPr>
         <p:spPr>
           <a:xfrm>
-            <a:off x="2815524" y="1315291"/>
+            <a:off x="2815524" y="1311618"/>
             <a:ext cx="954903" cy="383664"/>
           </a:xfrm>
           <a:prstGeom prst="rect">
@@ -3415,135 +3283,13 @@
       </p:sp>
       <p:sp>
         <p:nvSpPr>
-          <p:cNvPr id="14" name="Rectangle 13"/>
-          <p:cNvSpPr/>
-          <p:nvPr/>
-        </p:nvSpPr>
-        <p:spPr>
-          <a:xfrm>
-            <a:off x="4043198" y="1314657"/>
-            <a:ext cx="931430" cy="383664"/>
-          </a:xfrm>
-          <a:prstGeom prst="rect">
-            <a:avLst/>
-          </a:prstGeom>
-          <a:noFill/>
-          <a:ln w="6350">
-            <a:solidFill>
-              <a:schemeClr val="tx1"/>
-            </a:solidFill>
-          </a:ln>
-          <a:effectLst>
-            <a:glow rad="63500">
-              <a:schemeClr val="accent3">
-                <a:satMod val="175000"/>
-                <a:alpha val="40000"/>
-              </a:schemeClr>
-            </a:glow>
-          </a:effectLst>
-        </p:spPr>
-        <p:style>
-          <a:lnRef idx="2">
-            <a:schemeClr val="accent1">
-              <a:shade val="50000"/>
-            </a:schemeClr>
-          </a:lnRef>
-          <a:fillRef idx="1">
-            <a:schemeClr val="accent1"/>
-          </a:fillRef>
-          <a:effectRef idx="0">
-            <a:schemeClr val="accent1"/>
-          </a:effectRef>
-          <a:fontRef idx="minor">
-            <a:schemeClr val="lt1"/>
-          </a:fontRef>
-        </p:style>
-        <p:txBody>
-          <a:bodyPr rtlCol="0" anchor="ctr"/>
-          <a:lstStyle/>
-          <a:p>
-            <a:pPr algn="ctr"/>
-            <a:r>
-              <a:rPr lang="en-US" sz="900" dirty="0" smtClean="0">
-                <a:solidFill>
-                  <a:schemeClr val="tx1"/>
-                </a:solidFill>
-              </a:rPr>
-              <a:t>Safety Analysis Plugin</a:t>
-            </a:r>
-          </a:p>
-        </p:txBody>
-      </p:sp>
-      <p:sp>
-        <p:nvSpPr>
-          <p:cNvPr id="15" name="Rectangle 14"/>
-          <p:cNvSpPr/>
-          <p:nvPr/>
-        </p:nvSpPr>
-        <p:spPr>
-          <a:xfrm>
-            <a:off x="4043198" y="567264"/>
-            <a:ext cx="931430" cy="390375"/>
-          </a:xfrm>
-          <a:prstGeom prst="rect">
-            <a:avLst/>
-          </a:prstGeom>
-          <a:noFill/>
-          <a:ln w="6350">
-            <a:solidFill>
-              <a:schemeClr val="tx1"/>
-            </a:solidFill>
-          </a:ln>
-          <a:effectLst>
-            <a:glow rad="63500">
-              <a:schemeClr val="accent3">
-                <a:satMod val="175000"/>
-                <a:alpha val="40000"/>
-              </a:schemeClr>
-            </a:glow>
-          </a:effectLst>
-        </p:spPr>
-        <p:style>
-          <a:lnRef idx="2">
-            <a:schemeClr val="accent1">
-              <a:shade val="50000"/>
-            </a:schemeClr>
-          </a:lnRef>
-          <a:fillRef idx="1">
-            <a:schemeClr val="accent1"/>
-          </a:fillRef>
-          <a:effectRef idx="0">
-            <a:schemeClr val="accent1"/>
-          </a:effectRef>
-          <a:fontRef idx="minor">
-            <a:schemeClr val="lt1"/>
-          </a:fontRef>
-        </p:style>
-        <p:txBody>
-          <a:bodyPr rtlCol="0" anchor="ctr"/>
-          <a:lstStyle/>
-          <a:p>
-            <a:pPr algn="ctr"/>
-            <a:r>
-              <a:rPr lang="en-US" sz="900" dirty="0" smtClean="0">
-                <a:solidFill>
-                  <a:schemeClr val="tx1"/>
-                </a:solidFill>
-              </a:rPr>
-              <a:t>AGREE Analysis Plugin</a:t>
-            </a:r>
-          </a:p>
-        </p:txBody>
-      </p:sp>
-      <p:sp>
-        <p:nvSpPr>
           <p:cNvPr id="17" name="Rectangle 16"/>
           <p:cNvSpPr/>
           <p:nvPr/>
         </p:nvSpPr>
         <p:spPr>
           <a:xfrm>
-            <a:off x="2805448" y="578609"/>
+            <a:off x="2805448" y="567484"/>
             <a:ext cx="964979" cy="383664"/>
           </a:xfrm>
           <a:prstGeom prst="rect">
@@ -3597,14 +3343,14 @@
         <p:nvCxnSpPr>
           <p:cNvPr id="19" name="Straight Arrow Connector 18"/>
           <p:cNvCxnSpPr>
-            <a:endCxn id="10" idx="1"/>
+            <a:endCxn id="26" idx="1"/>
           </p:cNvCxnSpPr>
           <p:nvPr/>
         </p:nvCxnSpPr>
         <p:spPr>
           <a:xfrm>
-            <a:off x="1468441" y="773638"/>
-            <a:ext cx="256066" cy="0"/>
+            <a:off x="1468441" y="759316"/>
+            <a:ext cx="246539" cy="0"/>
           </a:xfrm>
           <a:prstGeom prst="straightConnector1">
             <a:avLst/>
@@ -3635,14 +3381,14 @@
         <p:nvCxnSpPr>
           <p:cNvPr id="20" name="Straight Arrow Connector 19"/>
           <p:cNvCxnSpPr>
-            <a:endCxn id="11" idx="1"/>
+            <a:endCxn id="39" idx="1"/>
           </p:cNvCxnSpPr>
           <p:nvPr/>
         </p:nvCxnSpPr>
         <p:spPr>
           <a:xfrm>
-            <a:off x="1478465" y="1497207"/>
-            <a:ext cx="251079" cy="9282"/>
+            <a:off x="1468441" y="1503450"/>
+            <a:ext cx="256064" cy="0"/>
           </a:xfrm>
           <a:prstGeom prst="straightConnector1">
             <a:avLst/>
@@ -3672,13 +3418,16 @@
       <p:cxnSp>
         <p:nvCxnSpPr>
           <p:cNvPr id="22" name="Straight Arrow Connector 21"/>
-          <p:cNvCxnSpPr/>
+          <p:cNvCxnSpPr>
+            <a:stCxn id="26" idx="3"/>
+            <a:endCxn id="17" idx="1"/>
+          </p:cNvCxnSpPr>
           <p:nvPr/>
         </p:nvCxnSpPr>
         <p:spPr>
           <a:xfrm>
-            <a:off x="2549383" y="777456"/>
-            <a:ext cx="256065" cy="0"/>
+            <a:off x="2545964" y="759316"/>
+            <a:ext cx="259484" cy="0"/>
           </a:xfrm>
           <a:prstGeom prst="straightConnector1">
             <a:avLst/>
@@ -3709,15 +3458,15 @@
         <p:nvCxnSpPr>
           <p:cNvPr id="23" name="Straight Arrow Connector 22"/>
           <p:cNvCxnSpPr>
-            <a:stCxn id="11" idx="3"/>
+            <a:stCxn id="39" idx="3"/>
             <a:endCxn id="12" idx="1"/>
           </p:cNvCxnSpPr>
           <p:nvPr/>
         </p:nvCxnSpPr>
         <p:spPr>
           <a:xfrm>
-            <a:off x="2555489" y="1506489"/>
-            <a:ext cx="260035" cy="634"/>
+            <a:off x="2555489" y="1503450"/>
+            <a:ext cx="260035" cy="0"/>
           </a:xfrm>
           <a:prstGeom prst="straightConnector1">
             <a:avLst/>
@@ -3749,14 +3498,14 @@
           <p:cNvPr id="24" name="Straight Arrow Connector 23"/>
           <p:cNvCxnSpPr>
             <a:stCxn id="17" idx="3"/>
-            <a:endCxn id="15" idx="1"/>
+            <a:endCxn id="37" idx="1"/>
           </p:cNvCxnSpPr>
           <p:nvPr/>
         </p:nvCxnSpPr>
         <p:spPr>
-          <a:xfrm flipV="1">
-            <a:off x="3770427" y="762452"/>
-            <a:ext cx="272771" cy="7989"/>
+          <a:xfrm>
+            <a:off x="3770427" y="759316"/>
+            <a:ext cx="272771" cy="0"/>
           </a:xfrm>
           <a:prstGeom prst="straightConnector1">
             <a:avLst/>
@@ -3788,14 +3537,14 @@
           <p:cNvPr id="25" name="Straight Arrow Connector 24"/>
           <p:cNvCxnSpPr>
             <a:stCxn id="12" idx="3"/>
-            <a:endCxn id="14" idx="1"/>
+            <a:endCxn id="38" idx="1"/>
           </p:cNvCxnSpPr>
           <p:nvPr/>
         </p:nvCxnSpPr>
         <p:spPr>
-          <a:xfrm flipV="1">
-            <a:off x="3770427" y="1506489"/>
-            <a:ext cx="272771" cy="634"/>
+          <a:xfrm>
+            <a:off x="3770427" y="1503450"/>
+            <a:ext cx="272771" cy="0"/>
           </a:xfrm>
           <a:prstGeom prst="straightConnector1">
             <a:avLst/>
@@ -3830,8 +3579,8 @@
         </p:nvCxnSpPr>
         <p:spPr>
           <a:xfrm>
-            <a:off x="4330080" y="960892"/>
-            <a:ext cx="4844" cy="353765"/>
+            <a:off x="4334924" y="955591"/>
+            <a:ext cx="0" cy="359066"/>
           </a:xfrm>
           <a:prstGeom prst="straightConnector1">
             <a:avLst/>
@@ -3876,7 +3625,7 @@
             <a:solidFill>
               <a:schemeClr val="tx1"/>
             </a:solidFill>
-            <a:prstDash val="dash"/>
+            <a:prstDash val="solid"/>
             <a:tailEnd type="triangle"/>
           </a:ln>
         </p:spPr>
@@ -3903,7 +3652,7 @@
         </p:nvSpPr>
         <p:spPr>
           <a:xfrm>
-            <a:off x="5306161" y="562048"/>
+            <a:off x="5294155" y="564129"/>
             <a:ext cx="931430" cy="390375"/>
           </a:xfrm>
           <a:prstGeom prst="rect">
@@ -3976,14 +3725,15 @@
         <p:nvCxnSpPr>
           <p:cNvPr id="49" name="Straight Arrow Connector 48"/>
           <p:cNvCxnSpPr>
-            <a:stCxn id="15" idx="3"/>
+            <a:stCxn id="37" idx="3"/>
+            <a:endCxn id="48" idx="1"/>
           </p:cNvCxnSpPr>
           <p:nvPr/>
         </p:nvCxnSpPr>
         <p:spPr>
           <a:xfrm>
-            <a:off x="4974628" y="762452"/>
-            <a:ext cx="340662" cy="0"/>
+            <a:off x="4974628" y="759316"/>
+            <a:ext cx="319527" cy="1"/>
           </a:xfrm>
           <a:prstGeom prst="straightConnector1">
             <a:avLst/>
@@ -4035,7 +3785,11 @@
             <a:pPr algn="r"/>
             <a:r>
               <a:rPr lang="en-US" sz="900" dirty="0" smtClean="0"/>
-              <a:t>Call Extension Point</a:t>
+              <a:t>Call Extension </a:t>
+            </a:r>
+            <a:r>
+              <a:rPr lang="en-US" sz="900" dirty="0" smtClean="0"/>
+              <a:t>Point</a:t>
             </a:r>
             <a:endParaRPr lang="en-US" sz="900" dirty="0"/>
           </a:p>
@@ -4071,85 +3825,19 @@
           </a:p>
         </p:txBody>
       </p:sp>
-      <p:sp>
-        <p:nvSpPr>
-          <p:cNvPr id="54" name="Rectangle 53"/>
-          <p:cNvSpPr/>
-          <p:nvPr/>
-        </p:nvSpPr>
-        <p:spPr>
-          <a:xfrm>
-            <a:off x="5306161" y="1307946"/>
-            <a:ext cx="931430" cy="390375"/>
-          </a:xfrm>
-          <a:prstGeom prst="rect">
-            <a:avLst/>
-          </a:prstGeom>
-          <a:noFill/>
-          <a:ln w="6350">
-            <a:solidFill>
-              <a:schemeClr val="tx1"/>
-            </a:solidFill>
-          </a:ln>
-          <a:effectLst>
-            <a:glow rad="63500">
-              <a:schemeClr val="accent3">
-                <a:satMod val="175000"/>
-                <a:alpha val="40000"/>
-              </a:schemeClr>
-            </a:glow>
-          </a:effectLst>
-        </p:spPr>
-        <p:style>
-          <a:lnRef idx="2">
-            <a:schemeClr val="accent1">
-              <a:shade val="50000"/>
-            </a:schemeClr>
-          </a:lnRef>
-          <a:fillRef idx="1">
-            <a:schemeClr val="accent1"/>
-          </a:fillRef>
-          <a:effectRef idx="0">
-            <a:schemeClr val="accent1"/>
-          </a:effectRef>
-          <a:fontRef idx="minor">
-            <a:schemeClr val="lt1"/>
-          </a:fontRef>
-        </p:style>
-        <p:txBody>
-          <a:bodyPr rtlCol="0" anchor="ctr"/>
-          <a:lstStyle/>
-          <a:p>
-            <a:pPr algn="ctr"/>
-            <a:r>
-              <a:rPr lang="en-US" sz="900" dirty="0" err="1" smtClean="0">
-                <a:solidFill>
-                  <a:schemeClr val="tx1"/>
-                </a:solidFill>
-              </a:rPr>
-              <a:t>JKind</a:t>
-            </a:r>
-            <a:endParaRPr lang="en-US" sz="900" dirty="0" smtClean="0">
-              <a:solidFill>
-                <a:schemeClr val="tx1"/>
-              </a:solidFill>
-            </a:endParaRPr>
-          </a:p>
-        </p:txBody>
-      </p:sp>
       <p:cxnSp>
         <p:nvCxnSpPr>
           <p:cNvPr id="61" name="Straight Arrow Connector 60"/>
           <p:cNvCxnSpPr>
             <a:stCxn id="48" idx="2"/>
-            <a:endCxn id="54" idx="0"/>
+            <a:endCxn id="53" idx="0"/>
           </p:cNvCxnSpPr>
           <p:nvPr/>
         </p:nvCxnSpPr>
         <p:spPr>
           <a:xfrm>
-            <a:off x="5771876" y="952423"/>
-            <a:ext cx="0" cy="355523"/>
+            <a:off x="5759870" y="954504"/>
+            <a:ext cx="0" cy="357220"/>
           </a:xfrm>
           <a:prstGeom prst="straightConnector1">
             <a:avLst/>
@@ -4176,6 +3864,296 @@
           </a:fontRef>
         </p:style>
       </p:cxnSp>
+      <p:sp>
+        <p:nvSpPr>
+          <p:cNvPr id="26" name="Rounded Rectangle 25"/>
+          <p:cNvSpPr/>
+          <p:nvPr/>
+        </p:nvSpPr>
+        <p:spPr>
+          <a:xfrm>
+            <a:off x="1714980" y="567590"/>
+            <a:ext cx="830984" cy="383452"/>
+          </a:xfrm>
+          <a:prstGeom prst="roundRect">
+            <a:avLst/>
+          </a:prstGeom>
+          <a:noFill/>
+          <a:ln>
+            <a:solidFill>
+              <a:schemeClr val="tx1"/>
+            </a:solidFill>
+          </a:ln>
+        </p:spPr>
+        <p:style>
+          <a:lnRef idx="2">
+            <a:schemeClr val="accent1">
+              <a:shade val="50000"/>
+            </a:schemeClr>
+          </a:lnRef>
+          <a:fillRef idx="1">
+            <a:schemeClr val="accent1"/>
+          </a:fillRef>
+          <a:effectRef idx="0">
+            <a:schemeClr val="accent1"/>
+          </a:effectRef>
+          <a:fontRef idx="minor">
+            <a:schemeClr val="lt1"/>
+          </a:fontRef>
+        </p:style>
+        <p:txBody>
+          <a:bodyPr lIns="0" rIns="0" rtlCol="0" anchor="ctr"/>
+          <a:lstStyle/>
+          <a:p>
+            <a:pPr algn="ctr"/>
+            <a:r>
+              <a:rPr lang="en-US" sz="900" dirty="0" smtClean="0">
+                <a:solidFill>
+                  <a:schemeClr val="tx1"/>
+                </a:solidFill>
+              </a:rPr>
+              <a:t>AGREE Parser</a:t>
+            </a:r>
+            <a:endParaRPr lang="en-US" sz="900" dirty="0">
+              <a:solidFill>
+                <a:schemeClr val="tx1"/>
+              </a:solidFill>
+            </a:endParaRPr>
+          </a:p>
+        </p:txBody>
+      </p:sp>
+      <p:sp>
+        <p:nvSpPr>
+          <p:cNvPr id="37" name="Rounded Rectangle 36"/>
+          <p:cNvSpPr/>
+          <p:nvPr/>
+        </p:nvSpPr>
+        <p:spPr>
+          <a:xfrm>
+            <a:off x="4043198" y="567590"/>
+            <a:ext cx="931430" cy="383452"/>
+          </a:xfrm>
+          <a:prstGeom prst="roundRect">
+            <a:avLst/>
+          </a:prstGeom>
+          <a:noFill/>
+          <a:ln>
+            <a:solidFill>
+              <a:schemeClr val="tx1"/>
+            </a:solidFill>
+          </a:ln>
+        </p:spPr>
+        <p:style>
+          <a:lnRef idx="2">
+            <a:schemeClr val="accent1">
+              <a:shade val="50000"/>
+            </a:schemeClr>
+          </a:lnRef>
+          <a:fillRef idx="1">
+            <a:schemeClr val="accent1"/>
+          </a:fillRef>
+          <a:effectRef idx="0">
+            <a:schemeClr val="accent1"/>
+          </a:effectRef>
+          <a:fontRef idx="minor">
+            <a:schemeClr val="lt1"/>
+          </a:fontRef>
+        </p:style>
+        <p:txBody>
+          <a:bodyPr lIns="0" rIns="0" rtlCol="0" anchor="ctr"/>
+          <a:lstStyle/>
+          <a:p>
+            <a:pPr algn="ctr"/>
+            <a:r>
+              <a:rPr lang="en-US" sz="900" dirty="0" smtClean="0">
+                <a:solidFill>
+                  <a:schemeClr val="tx1"/>
+                </a:solidFill>
+              </a:rPr>
+              <a:t>AGREE Analysis Plugin</a:t>
+            </a:r>
+            <a:endParaRPr lang="en-US" sz="900" dirty="0">
+              <a:solidFill>
+                <a:schemeClr val="tx1"/>
+              </a:solidFill>
+            </a:endParaRPr>
+          </a:p>
+        </p:txBody>
+      </p:sp>
+      <p:sp>
+        <p:nvSpPr>
+          <p:cNvPr id="38" name="Rounded Rectangle 37"/>
+          <p:cNvSpPr/>
+          <p:nvPr/>
+        </p:nvSpPr>
+        <p:spPr>
+          <a:xfrm>
+            <a:off x="4043198" y="1311724"/>
+            <a:ext cx="931430" cy="383452"/>
+          </a:xfrm>
+          <a:prstGeom prst="roundRect">
+            <a:avLst/>
+          </a:prstGeom>
+          <a:noFill/>
+          <a:ln>
+            <a:solidFill>
+              <a:schemeClr val="tx1"/>
+            </a:solidFill>
+          </a:ln>
+        </p:spPr>
+        <p:style>
+          <a:lnRef idx="2">
+            <a:schemeClr val="accent1">
+              <a:shade val="50000"/>
+            </a:schemeClr>
+          </a:lnRef>
+          <a:fillRef idx="1">
+            <a:schemeClr val="accent1"/>
+          </a:fillRef>
+          <a:effectRef idx="0">
+            <a:schemeClr val="accent1"/>
+          </a:effectRef>
+          <a:fontRef idx="minor">
+            <a:schemeClr val="lt1"/>
+          </a:fontRef>
+        </p:style>
+        <p:txBody>
+          <a:bodyPr lIns="0" rIns="0" rtlCol="0" anchor="ctr"/>
+          <a:lstStyle/>
+          <a:p>
+            <a:pPr algn="ctr"/>
+            <a:r>
+              <a:rPr lang="en-US" sz="900" dirty="0" smtClean="0">
+                <a:solidFill>
+                  <a:schemeClr val="tx1"/>
+                </a:solidFill>
+              </a:rPr>
+              <a:t>Safety Analysis Plugin</a:t>
+            </a:r>
+            <a:endParaRPr lang="en-US" sz="900" dirty="0">
+              <a:solidFill>
+                <a:schemeClr val="tx1"/>
+              </a:solidFill>
+            </a:endParaRPr>
+          </a:p>
+        </p:txBody>
+      </p:sp>
+      <p:sp>
+        <p:nvSpPr>
+          <p:cNvPr id="39" name="Rounded Rectangle 38"/>
+          <p:cNvSpPr/>
+          <p:nvPr/>
+        </p:nvSpPr>
+        <p:spPr>
+          <a:xfrm>
+            <a:off x="1724505" y="1311724"/>
+            <a:ext cx="830984" cy="383452"/>
+          </a:xfrm>
+          <a:prstGeom prst="roundRect">
+            <a:avLst/>
+          </a:prstGeom>
+          <a:noFill/>
+          <a:ln>
+            <a:solidFill>
+              <a:schemeClr val="tx1"/>
+            </a:solidFill>
+          </a:ln>
+        </p:spPr>
+        <p:style>
+          <a:lnRef idx="2">
+            <a:schemeClr val="accent1">
+              <a:shade val="50000"/>
+            </a:schemeClr>
+          </a:lnRef>
+          <a:fillRef idx="1">
+            <a:schemeClr val="accent1"/>
+          </a:fillRef>
+          <a:effectRef idx="0">
+            <a:schemeClr val="accent1"/>
+          </a:effectRef>
+          <a:fontRef idx="minor">
+            <a:schemeClr val="lt1"/>
+          </a:fontRef>
+        </p:style>
+        <p:txBody>
+          <a:bodyPr lIns="0" rIns="0" rtlCol="0" anchor="ctr"/>
+          <a:lstStyle/>
+          <a:p>
+            <a:pPr algn="ctr"/>
+            <a:r>
+              <a:rPr lang="en-US" sz="900" dirty="0" smtClean="0">
+                <a:solidFill>
+                  <a:schemeClr val="tx1"/>
+                </a:solidFill>
+              </a:rPr>
+              <a:t>Safety Parser</a:t>
+            </a:r>
+            <a:endParaRPr lang="en-US" sz="900" dirty="0">
+              <a:solidFill>
+                <a:schemeClr val="tx1"/>
+              </a:solidFill>
+            </a:endParaRPr>
+          </a:p>
+        </p:txBody>
+      </p:sp>
+      <p:sp>
+        <p:nvSpPr>
+          <p:cNvPr id="53" name="Rounded Rectangle 52"/>
+          <p:cNvSpPr/>
+          <p:nvPr/>
+        </p:nvSpPr>
+        <p:spPr>
+          <a:xfrm>
+            <a:off x="5294155" y="1311724"/>
+            <a:ext cx="931430" cy="383452"/>
+          </a:xfrm>
+          <a:prstGeom prst="roundRect">
+            <a:avLst/>
+          </a:prstGeom>
+          <a:noFill/>
+          <a:ln>
+            <a:solidFill>
+              <a:schemeClr val="tx1"/>
+            </a:solidFill>
+          </a:ln>
+        </p:spPr>
+        <p:style>
+          <a:lnRef idx="2">
+            <a:schemeClr val="accent1">
+              <a:shade val="50000"/>
+            </a:schemeClr>
+          </a:lnRef>
+          <a:fillRef idx="1">
+            <a:schemeClr val="accent1"/>
+          </a:fillRef>
+          <a:effectRef idx="0">
+            <a:schemeClr val="accent1"/>
+          </a:effectRef>
+          <a:fontRef idx="minor">
+            <a:schemeClr val="lt1"/>
+          </a:fontRef>
+        </p:style>
+        <p:txBody>
+          <a:bodyPr lIns="0" rIns="0" rtlCol="0" anchor="ctr"/>
+          <a:lstStyle/>
+          <a:p>
+            <a:pPr algn="ctr"/>
+            <a:r>
+              <a:rPr lang="en-US" sz="900" dirty="0" err="1" smtClean="0">
+                <a:solidFill>
+                  <a:schemeClr val="tx1"/>
+                </a:solidFill>
+              </a:rPr>
+              <a:t>JKind</a:t>
+            </a:r>
+            <a:endParaRPr lang="en-US" sz="900" dirty="0">
+              <a:solidFill>
+                <a:schemeClr val="tx1"/>
+              </a:solidFill>
+            </a:endParaRPr>
+          </a:p>
+        </p:txBody>
+      </p:sp>
     </p:spTree>
     <p:extLst>
       <p:ext uri="{BB962C8B-B14F-4D97-AF65-F5344CB8AC3E}">
@@ -4214,7 +4192,7 @@
         </p:nvSpPr>
         <p:spPr>
           <a:xfrm>
-            <a:off x="476922" y="127359"/>
+            <a:off x="807432" y="138376"/>
             <a:ext cx="4057426" cy="2123658"/>
           </a:xfrm>
           <a:prstGeom prst="rect">
@@ -4384,8 +4362,8 @@
         </p:nvSpPr>
         <p:spPr>
           <a:xfrm>
-            <a:off x="5029200" y="127359"/>
-            <a:ext cx="6067312" cy="4524315"/>
+            <a:off x="4687673" y="127359"/>
+            <a:ext cx="5285002" cy="4524315"/>
           </a:xfrm>
           <a:prstGeom prst="rect">
             <a:avLst/>
@@ -4655,13 +4633,7 @@
               <a:rPr lang="en-US" sz="1200" dirty="0" smtClean="0">
                 <a:latin typeface="Consolas" panose="020B0609020204030204" pitchFamily="49" charset="0"/>
               </a:rPr>
-              <a:t>	faults</a:t>
-            </a:r>
-            <a:r>
-              <a:rPr lang="en-US" sz="1200" dirty="0" smtClean="0">
-                <a:latin typeface="Consolas" panose="020B0609020204030204" pitchFamily="49" charset="0"/>
-              </a:rPr>
-              <a:t>__</a:t>
+              <a:t>	faults__</a:t>
             </a:r>
             <a:r>
               <a:rPr lang="en-US" sz="1200" dirty="0" err="1" smtClean="0">
@@ -4751,18 +4723,29 @@
       </p:sp>
       <p:sp>
         <p:nvSpPr>
-          <p:cNvPr id="4" name="Right Arrow 3"/>
+          <p:cNvPr id="5" name="Bent Arrow 4"/>
           <p:cNvSpPr/>
           <p:nvPr/>
         </p:nvSpPr>
         <p:spPr>
-          <a:xfrm>
-            <a:off x="4136315" y="1376979"/>
-            <a:ext cx="591671" cy="344245"/>
+          <a:xfrm flipV="1">
+            <a:off x="3349134" y="2422567"/>
+            <a:ext cx="782197" cy="739274"/>
           </a:xfrm>
-          <a:prstGeom prst="rightArrow">
-            <a:avLst/>
+          <a:prstGeom prst="bentArrow">
+            <a:avLst>
+              <a:gd name="adj1" fmla="val 30961"/>
+              <a:gd name="adj2" fmla="val 27235"/>
+              <a:gd name="adj3" fmla="val 25000"/>
+              <a:gd name="adj4" fmla="val 43750"/>
+            </a:avLst>
           </a:prstGeom>
+          <a:noFill/>
+          <a:ln>
+            <a:solidFill>
+              <a:schemeClr val="tx1"/>
+            </a:solidFill>
+          </a:ln>
         </p:spPr>
         <p:style>
           <a:lnRef idx="2">
@@ -4785,7 +4768,11 @@
           <a:lstStyle/>
           <a:p>
             <a:pPr algn="ctr"/>
-            <a:endParaRPr lang="en-US"/>
+            <a:endParaRPr lang="en-US">
+              <a:solidFill>
+                <a:schemeClr val="tx1"/>
+              </a:solidFill>
+            </a:endParaRPr>
           </a:p>
         </p:txBody>
       </p:sp>
@@ -5057,7 +5044,7 @@
   <a:extraClrSchemeLst/>
   <a:extLst>
     <a:ext uri="{05A4C25C-085E-4340-85A3-A5531E510DB2}">
-      <thm15:themeFamily xmlns:thm15="http://schemas.microsoft.com/office/thememl/2012/main" name="Office Theme" id="{62F939B6-93AF-4DB8-9C6B-D6C7DFDC589F}" vid="{4A3C46E8-61CC-4603-A589-7422A47A8E4A}"/>
+      <thm15:themeFamily xmlns:thm15="http://schemas.microsoft.com/office/thememl/2012/main" xmlns="" name="Office Theme" id="{62F939B6-93AF-4DB8-9C6B-D6C7DFDC589F}" vid="{4A3C46E8-61CC-4603-A589-7422A47A8E4A}"/>
     </a:ext>
   </a:extLst>
 </a:theme>

</xml_diff>

<commit_message>
MWW: normalized Section 2 to the architecture section and added probability
</commit_message>
<xml_diff>
--- a/doc/NFM_2018/Presentation1.pptx
+++ b/doc/NFM_2018/Presentation1.pptx
@@ -8,6 +8,7 @@
     <p:sldId id="256" r:id="rId2"/>
     <p:sldId id="257" r:id="rId3"/>
     <p:sldId id="258" r:id="rId4"/>
+    <p:sldId id="259" r:id="rId5"/>
   </p:sldIdLst>
   <p:sldSz cx="12192000" cy="6858000"/>
   <p:notesSz cx="6858000" cy="9144000"/>
@@ -108,7 +109,18 @@
   </p:defaultTextStyle>
   <p:extLst>
     <p:ext uri="{EFAFB233-063F-42B5-8137-9DF3F51BA10A}">
-      <p15:sldGuideLst xmlns:p15="http://schemas.microsoft.com/office/powerpoint/2012/main" xmlns=""/>
+      <p15:sldGuideLst xmlns:p15="http://schemas.microsoft.com/office/powerpoint/2012/main">
+        <p15:guide id="1" orient="horz" pos="2160">
+          <p15:clr>
+            <a:srgbClr val="A4A3A4"/>
+          </p15:clr>
+        </p15:guide>
+        <p15:guide id="2" pos="3840">
+          <p15:clr>
+            <a:srgbClr val="A4A3A4"/>
+          </p15:clr>
+        </p15:guide>
+      </p15:sldGuideLst>
     </p:ext>
   </p:extLst>
 </p:presentation>
@@ -3785,11 +3797,7 @@
             <a:pPr algn="r"/>
             <a:r>
               <a:rPr lang="en-US" sz="900" dirty="0" smtClean="0"/>
-              <a:t>Call Extension </a:t>
-            </a:r>
-            <a:r>
-              <a:rPr lang="en-US" sz="900" dirty="0" smtClean="0"/>
-              <a:t>Point</a:t>
+              <a:t>Call Extension Point</a:t>
             </a:r>
             <a:endParaRPr lang="en-US" sz="900" dirty="0"/>
           </a:p>
@@ -4780,6 +4788,627 @@
     <p:extLst>
       <p:ext uri="{BB962C8B-B14F-4D97-AF65-F5344CB8AC3E}">
         <p14:creationId xmlns:p14="http://schemas.microsoft.com/office/powerpoint/2010/main" val="3430048476"/>
+      </p:ext>
+    </p:extLst>
+  </p:cSld>
+  <p:clrMapOvr>
+    <a:masterClrMapping/>
+  </p:clrMapOvr>
+</p:sld>
+</file>
+
+<file path=ppt/slides/slide4.xml><?xml version="1.0" encoding="utf-8"?>
+<p:sld xmlns:a="http://schemas.openxmlformats.org/drawingml/2006/main" xmlns:r="http://schemas.openxmlformats.org/officeDocument/2006/relationships" xmlns:p="http://schemas.openxmlformats.org/presentationml/2006/main">
+  <p:cSld>
+    <p:spTree>
+      <p:nvGrpSpPr>
+        <p:cNvPr id="1" name=""/>
+        <p:cNvGrpSpPr/>
+        <p:nvPr/>
+      </p:nvGrpSpPr>
+      <p:grpSpPr>
+        <a:xfrm>
+          <a:off x="0" y="0"/>
+          <a:ext cx="0" cy="0"/>
+          <a:chOff x="0" y="0"/>
+          <a:chExt cx="0" cy="0"/>
+        </a:xfrm>
+      </p:grpSpPr>
+      <p:sp>
+        <p:nvSpPr>
+          <p:cNvPr id="3" name="Rectangle 2"/>
+          <p:cNvSpPr/>
+          <p:nvPr/>
+        </p:nvSpPr>
+        <p:spPr>
+          <a:xfrm>
+            <a:off x="0" y="13960"/>
+            <a:ext cx="11551920" cy="2554545"/>
+          </a:xfrm>
+          <a:prstGeom prst="rect">
+            <a:avLst/>
+          </a:prstGeom>
+        </p:spPr>
+        <p:txBody>
+          <a:bodyPr wrap="square">
+            <a:spAutoFit/>
+          </a:bodyPr>
+          <a:lstStyle/>
+          <a:p>
+            <a:r>
+              <a:rPr lang="en-US" sz="1600" b="1" dirty="0">
+                <a:solidFill>
+                  <a:srgbClr val="7F0055"/>
+                </a:solidFill>
+                <a:latin typeface="Consolas" panose="020B0609020204030204" pitchFamily="49" charset="0"/>
+              </a:rPr>
+              <a:t>annex</a:t>
+            </a:r>
+            <a:r>
+              <a:rPr lang="en-US" sz="1600" b="1" dirty="0">
+                <a:solidFill>
+                  <a:srgbClr val="000000"/>
+                </a:solidFill>
+                <a:latin typeface="Consolas" panose="020B0609020204030204" pitchFamily="49" charset="0"/>
+              </a:rPr>
+              <a:t> safety {**</a:t>
+            </a:r>
+          </a:p>
+          <a:p>
+            <a:r>
+              <a:rPr lang="en-US" sz="1600" b="1" dirty="0" smtClean="0">
+                <a:solidFill>
+                  <a:srgbClr val="7F0055"/>
+                </a:solidFill>
+                <a:latin typeface="Consolas" panose="020B0609020204030204" pitchFamily="49" charset="0"/>
+              </a:rPr>
+              <a:t>  fault</a:t>
+            </a:r>
+            <a:r>
+              <a:rPr lang="en-US" sz="1600" b="1" dirty="0" smtClean="0">
+                <a:solidFill>
+                  <a:srgbClr val="000000"/>
+                </a:solidFill>
+                <a:latin typeface="Consolas" panose="020B0609020204030204" pitchFamily="49" charset="0"/>
+              </a:rPr>
+              <a:t> </a:t>
+            </a:r>
+            <a:r>
+              <a:rPr lang="en-US" sz="1600" b="1" dirty="0">
+                <a:solidFill>
+                  <a:srgbClr val="2A00FF"/>
+                </a:solidFill>
+                <a:latin typeface="Consolas" panose="020B0609020204030204" pitchFamily="49" charset="0"/>
+              </a:rPr>
+              <a:t>"In pump: </a:t>
+            </a:r>
+            <a:r>
+              <a:rPr lang="en-US" sz="1600" b="1" dirty="0" err="1">
+                <a:solidFill>
+                  <a:srgbClr val="2A00FF"/>
+                </a:solidFill>
+                <a:latin typeface="Consolas" panose="020B0609020204030204" pitchFamily="49" charset="0"/>
+              </a:rPr>
+              <a:t>pressure_output</a:t>
+            </a:r>
+            <a:r>
+              <a:rPr lang="en-US" sz="1600" b="1" dirty="0">
+                <a:solidFill>
+                  <a:srgbClr val="2A00FF"/>
+                </a:solidFill>
+                <a:latin typeface="Consolas" panose="020B0609020204030204" pitchFamily="49" charset="0"/>
+              </a:rPr>
+              <a:t> failed to non-deterministic value."</a:t>
+            </a:r>
+            <a:r>
+              <a:rPr lang="en-US" sz="1600" b="1" dirty="0">
+                <a:solidFill>
+                  <a:srgbClr val="7F0055"/>
+                </a:solidFill>
+                <a:latin typeface="Consolas" panose="020B0609020204030204" pitchFamily="49" charset="0"/>
+              </a:rPr>
+              <a:t>:</a:t>
+            </a:r>
+            <a:r>
+              <a:rPr lang="en-US" sz="1600" b="1" dirty="0">
+                <a:solidFill>
+                  <a:srgbClr val="000000"/>
+                </a:solidFill>
+                <a:latin typeface="Consolas" panose="020B0609020204030204" pitchFamily="49" charset="0"/>
+              </a:rPr>
+              <a:t> </a:t>
+            </a:r>
+            <a:r>
+              <a:rPr lang="en-US" sz="1600" b="1" dirty="0" smtClean="0">
+                <a:solidFill>
+                  <a:srgbClr val="000000"/>
+                </a:solidFill>
+                <a:latin typeface="Consolas" panose="020B0609020204030204" pitchFamily="49" charset="0"/>
+              </a:rPr>
+              <a:t>  </a:t>
+            </a:r>
+            <a:r>
+              <a:rPr lang="en-US" sz="1600" b="1" dirty="0" err="1" smtClean="0">
+                <a:solidFill>
+                  <a:srgbClr val="000000"/>
+                </a:solidFill>
+                <a:latin typeface="Consolas" panose="020B0609020204030204" pitchFamily="49" charset="0"/>
+              </a:rPr>
+              <a:t>faults</a:t>
+            </a:r>
+            <a:r>
+              <a:rPr lang="en-US" sz="1600" b="1" dirty="0" err="1" smtClean="0">
+                <a:solidFill>
+                  <a:srgbClr val="7F0055"/>
+                </a:solidFill>
+                <a:latin typeface="Consolas" panose="020B0609020204030204" pitchFamily="49" charset="0"/>
+              </a:rPr>
+              <a:t>.</a:t>
+            </a:r>
+            <a:r>
+              <a:rPr lang="en-US" sz="1600" b="1" dirty="0" err="1" smtClean="0">
+                <a:solidFill>
+                  <a:srgbClr val="000000"/>
+                </a:solidFill>
+                <a:latin typeface="Consolas" panose="020B0609020204030204" pitchFamily="49" charset="0"/>
+              </a:rPr>
+              <a:t>fail_to</a:t>
+            </a:r>
+            <a:r>
+              <a:rPr lang="en-US" sz="1600" b="1" dirty="0" smtClean="0">
+                <a:solidFill>
+                  <a:srgbClr val="000000"/>
+                </a:solidFill>
+                <a:latin typeface="Consolas" panose="020B0609020204030204" pitchFamily="49" charset="0"/>
+              </a:rPr>
+              <a:t> </a:t>
+            </a:r>
+            <a:r>
+              <a:rPr lang="en-US" sz="1600" b="1" dirty="0">
+                <a:solidFill>
+                  <a:srgbClr val="7F0055"/>
+                </a:solidFill>
+                <a:latin typeface="Consolas" panose="020B0609020204030204" pitchFamily="49" charset="0"/>
+              </a:rPr>
+              <a:t>{</a:t>
+            </a:r>
+          </a:p>
+          <a:p>
+            <a:r>
+              <a:rPr lang="en-US" sz="1600" b="1" dirty="0">
+                <a:solidFill>
+                  <a:srgbClr val="7F0055"/>
+                </a:solidFill>
+                <a:latin typeface="Consolas" panose="020B0609020204030204" pitchFamily="49" charset="0"/>
+              </a:rPr>
+              <a:t> </a:t>
+            </a:r>
+            <a:r>
+              <a:rPr lang="en-US" sz="1600" b="1" dirty="0" smtClean="0">
+                <a:solidFill>
+                  <a:srgbClr val="7F0055"/>
+                </a:solidFill>
+                <a:latin typeface="Consolas" panose="020B0609020204030204" pitchFamily="49" charset="0"/>
+              </a:rPr>
+              <a:t>   </a:t>
+            </a:r>
+            <a:r>
+              <a:rPr lang="en-US" sz="1600" b="1" dirty="0" err="1" smtClean="0">
+                <a:solidFill>
+                  <a:srgbClr val="7F0055"/>
+                </a:solidFill>
+                <a:latin typeface="Consolas" panose="020B0609020204030204" pitchFamily="49" charset="0"/>
+              </a:rPr>
+              <a:t>eq</a:t>
+            </a:r>
+            <a:r>
+              <a:rPr lang="en-US" sz="1600" b="1" dirty="0" smtClean="0">
+                <a:solidFill>
+                  <a:srgbClr val="000000"/>
+                </a:solidFill>
+                <a:latin typeface="Consolas" panose="020B0609020204030204" pitchFamily="49" charset="0"/>
+              </a:rPr>
+              <a:t> </a:t>
+            </a:r>
+            <a:r>
+              <a:rPr lang="en-US" sz="1600" b="1" dirty="0" err="1">
+                <a:solidFill>
+                  <a:srgbClr val="000000"/>
+                </a:solidFill>
+                <a:latin typeface="Consolas" panose="020B0609020204030204" pitchFamily="49" charset="0"/>
+              </a:rPr>
+              <a:t>alt_value</a:t>
+            </a:r>
+            <a:r>
+              <a:rPr lang="en-US" sz="1600" b="1" dirty="0">
+                <a:solidFill>
+                  <a:srgbClr val="000000"/>
+                </a:solidFill>
+                <a:latin typeface="Consolas" panose="020B0609020204030204" pitchFamily="49" charset="0"/>
+              </a:rPr>
+              <a:t> </a:t>
+            </a:r>
+            <a:r>
+              <a:rPr lang="en-US" sz="1600" b="1" dirty="0">
+                <a:solidFill>
+                  <a:srgbClr val="7F0055"/>
+                </a:solidFill>
+                <a:latin typeface="Consolas" panose="020B0609020204030204" pitchFamily="49" charset="0"/>
+              </a:rPr>
+              <a:t>:real;</a:t>
+            </a:r>
+          </a:p>
+          <a:p>
+            <a:r>
+              <a:rPr lang="en-US" sz="1600" b="1" dirty="0" smtClean="0">
+                <a:solidFill>
+                  <a:srgbClr val="7F0055"/>
+                </a:solidFill>
+                <a:latin typeface="Consolas" panose="020B0609020204030204" pitchFamily="49" charset="0"/>
+              </a:rPr>
+              <a:t>    inputs</a:t>
+            </a:r>
+            <a:r>
+              <a:rPr lang="en-US" sz="1600" b="1" dirty="0">
+                <a:solidFill>
+                  <a:srgbClr val="7F0055"/>
+                </a:solidFill>
+                <a:latin typeface="Consolas" panose="020B0609020204030204" pitchFamily="49" charset="0"/>
+              </a:rPr>
+              <a:t>:</a:t>
+            </a:r>
+            <a:r>
+              <a:rPr lang="en-US" sz="1600" b="1" dirty="0">
+                <a:solidFill>
+                  <a:srgbClr val="000000"/>
+                </a:solidFill>
+                <a:latin typeface="Consolas" panose="020B0609020204030204" pitchFamily="49" charset="0"/>
+              </a:rPr>
+              <a:t> </a:t>
+            </a:r>
+            <a:r>
+              <a:rPr lang="en-US" sz="1600" b="1" dirty="0" err="1">
+                <a:solidFill>
+                  <a:srgbClr val="000000"/>
+                </a:solidFill>
+                <a:latin typeface="Consolas" panose="020B0609020204030204" pitchFamily="49" charset="0"/>
+              </a:rPr>
+              <a:t>val_in</a:t>
+            </a:r>
+            <a:r>
+              <a:rPr lang="en-US" sz="1600" b="1" dirty="0">
+                <a:solidFill>
+                  <a:srgbClr val="000000"/>
+                </a:solidFill>
+                <a:latin typeface="Consolas" panose="020B0609020204030204" pitchFamily="49" charset="0"/>
+              </a:rPr>
+              <a:t> </a:t>
+            </a:r>
+            <a:r>
+              <a:rPr lang="en-US" sz="1600" b="1" dirty="0">
+                <a:solidFill>
+                  <a:srgbClr val="7F0055"/>
+                </a:solidFill>
+                <a:latin typeface="Consolas" panose="020B0609020204030204" pitchFamily="49" charset="0"/>
+              </a:rPr>
+              <a:t>&lt;-</a:t>
+            </a:r>
+            <a:r>
+              <a:rPr lang="en-US" sz="1600" b="1" dirty="0">
+                <a:solidFill>
+                  <a:srgbClr val="000000"/>
+                </a:solidFill>
+                <a:latin typeface="Consolas" panose="020B0609020204030204" pitchFamily="49" charset="0"/>
+              </a:rPr>
+              <a:t> </a:t>
+            </a:r>
+            <a:r>
+              <a:rPr lang="en-US" sz="1600" b="1" dirty="0" err="1">
+                <a:solidFill>
+                  <a:srgbClr val="000000"/>
+                </a:solidFill>
+                <a:latin typeface="Consolas" panose="020B0609020204030204" pitchFamily="49" charset="0"/>
+              </a:rPr>
+              <a:t>pressure_output</a:t>
+            </a:r>
+            <a:r>
+              <a:rPr lang="en-US" sz="1600" b="1" dirty="0">
+                <a:solidFill>
+                  <a:srgbClr val="7F0055"/>
+                </a:solidFill>
+                <a:latin typeface="Consolas" panose="020B0609020204030204" pitchFamily="49" charset="0"/>
+              </a:rPr>
+              <a:t>,</a:t>
+            </a:r>
+          </a:p>
+          <a:p>
+            <a:r>
+              <a:rPr lang="en-US" sz="1600" dirty="0" smtClean="0">
+                <a:solidFill>
+                  <a:srgbClr val="000000"/>
+                </a:solidFill>
+                <a:latin typeface="Consolas" panose="020B0609020204030204" pitchFamily="49" charset="0"/>
+              </a:rPr>
+              <a:t>            </a:t>
+            </a:r>
+            <a:r>
+              <a:rPr lang="en-US" sz="1600" b="1" dirty="0" err="1" smtClean="0">
+                <a:solidFill>
+                  <a:srgbClr val="000000"/>
+                </a:solidFill>
+                <a:latin typeface="Consolas" panose="020B0609020204030204" pitchFamily="49" charset="0"/>
+              </a:rPr>
+              <a:t>alt_val</a:t>
+            </a:r>
+            <a:r>
+              <a:rPr lang="en-US" sz="1600" b="1" dirty="0" smtClean="0">
+                <a:solidFill>
+                  <a:srgbClr val="000000"/>
+                </a:solidFill>
+                <a:latin typeface="Consolas" panose="020B0609020204030204" pitchFamily="49" charset="0"/>
+              </a:rPr>
+              <a:t> </a:t>
+            </a:r>
+            <a:r>
+              <a:rPr lang="en-US" sz="1600" b="1" dirty="0">
+                <a:solidFill>
+                  <a:srgbClr val="7F0055"/>
+                </a:solidFill>
+                <a:latin typeface="Consolas" panose="020B0609020204030204" pitchFamily="49" charset="0"/>
+              </a:rPr>
+              <a:t>&lt;-</a:t>
+            </a:r>
+            <a:r>
+              <a:rPr lang="en-US" sz="1600" b="1" dirty="0">
+                <a:solidFill>
+                  <a:srgbClr val="000000"/>
+                </a:solidFill>
+                <a:latin typeface="Consolas" panose="020B0609020204030204" pitchFamily="49" charset="0"/>
+              </a:rPr>
+              <a:t> </a:t>
+            </a:r>
+            <a:r>
+              <a:rPr lang="en-US" sz="1600" b="1" dirty="0" err="1">
+                <a:solidFill>
+                  <a:srgbClr val="000000"/>
+                </a:solidFill>
+                <a:latin typeface="Consolas" panose="020B0609020204030204" pitchFamily="49" charset="0"/>
+              </a:rPr>
+              <a:t>alt_value</a:t>
+            </a:r>
+            <a:r>
+              <a:rPr lang="en-US" sz="1600" b="1" dirty="0">
+                <a:solidFill>
+                  <a:srgbClr val="7F0055"/>
+                </a:solidFill>
+                <a:latin typeface="Consolas" panose="020B0609020204030204" pitchFamily="49" charset="0"/>
+              </a:rPr>
+              <a:t>;</a:t>
+            </a:r>
+            <a:r>
+              <a:rPr lang="en-US" sz="1600" b="1" dirty="0">
+                <a:solidFill>
+                  <a:srgbClr val="000000"/>
+                </a:solidFill>
+                <a:latin typeface="Consolas" panose="020B0609020204030204" pitchFamily="49" charset="0"/>
+              </a:rPr>
+              <a:t> </a:t>
+            </a:r>
+          </a:p>
+          <a:p>
+            <a:r>
+              <a:rPr lang="en-US" sz="1600" b="1" dirty="0" smtClean="0">
+                <a:solidFill>
+                  <a:srgbClr val="7F0055"/>
+                </a:solidFill>
+                <a:latin typeface="Consolas" panose="020B0609020204030204" pitchFamily="49" charset="0"/>
+              </a:rPr>
+              <a:t>    outputs</a:t>
+            </a:r>
+            <a:r>
+              <a:rPr lang="en-US" sz="1600" b="1" dirty="0">
+                <a:solidFill>
+                  <a:srgbClr val="7F0055"/>
+                </a:solidFill>
+                <a:latin typeface="Consolas" panose="020B0609020204030204" pitchFamily="49" charset="0"/>
+              </a:rPr>
+              <a:t>:</a:t>
+            </a:r>
+            <a:r>
+              <a:rPr lang="en-US" sz="1600" b="1" dirty="0">
+                <a:solidFill>
+                  <a:srgbClr val="000000"/>
+                </a:solidFill>
+                <a:latin typeface="Consolas" panose="020B0609020204030204" pitchFamily="49" charset="0"/>
+              </a:rPr>
+              <a:t> </a:t>
+            </a:r>
+            <a:r>
+              <a:rPr lang="en-US" sz="1600" b="1" dirty="0" err="1" smtClean="0">
+                <a:solidFill>
+                  <a:srgbClr val="000000"/>
+                </a:solidFill>
+                <a:latin typeface="Consolas" panose="020B0609020204030204" pitchFamily="49" charset="0"/>
+              </a:rPr>
+              <a:t>pressure_output.val</a:t>
+            </a:r>
+            <a:r>
+              <a:rPr lang="en-US" sz="1600" b="1" dirty="0" smtClean="0">
+                <a:solidFill>
+                  <a:srgbClr val="000000"/>
+                </a:solidFill>
+                <a:latin typeface="Consolas" panose="020B0609020204030204" pitchFamily="49" charset="0"/>
+              </a:rPr>
+              <a:t> </a:t>
+            </a:r>
+            <a:r>
+              <a:rPr lang="en-US" sz="1600" b="1" dirty="0">
+                <a:solidFill>
+                  <a:srgbClr val="7F0055"/>
+                </a:solidFill>
+                <a:latin typeface="Consolas" panose="020B0609020204030204" pitchFamily="49" charset="0"/>
+              </a:rPr>
+              <a:t>&lt;-</a:t>
+            </a:r>
+            <a:r>
+              <a:rPr lang="en-US" sz="1600" b="1" dirty="0">
+                <a:solidFill>
+                  <a:srgbClr val="000000"/>
+                </a:solidFill>
+                <a:latin typeface="Consolas" panose="020B0609020204030204" pitchFamily="49" charset="0"/>
+              </a:rPr>
+              <a:t> </a:t>
+            </a:r>
+            <a:r>
+              <a:rPr lang="en-US" sz="1600" b="1" dirty="0" err="1">
+                <a:solidFill>
+                  <a:srgbClr val="000000"/>
+                </a:solidFill>
+                <a:latin typeface="Consolas" panose="020B0609020204030204" pitchFamily="49" charset="0"/>
+              </a:rPr>
+              <a:t>val_out</a:t>
+            </a:r>
+            <a:r>
+              <a:rPr lang="en-US" sz="1600" b="1" dirty="0">
+                <a:solidFill>
+                  <a:srgbClr val="000000"/>
+                </a:solidFill>
+                <a:latin typeface="Consolas" panose="020B0609020204030204" pitchFamily="49" charset="0"/>
+              </a:rPr>
+              <a:t> </a:t>
+            </a:r>
+            <a:r>
+              <a:rPr lang="en-US" sz="1600" b="1" dirty="0">
+                <a:solidFill>
+                  <a:srgbClr val="7F0055"/>
+                </a:solidFill>
+                <a:latin typeface="Consolas" panose="020B0609020204030204" pitchFamily="49" charset="0"/>
+              </a:rPr>
+              <a:t>;</a:t>
+            </a:r>
+            <a:r>
+              <a:rPr lang="en-US" sz="1600" b="1" dirty="0">
+                <a:solidFill>
+                  <a:srgbClr val="000000"/>
+                </a:solidFill>
+                <a:latin typeface="Consolas" panose="020B0609020204030204" pitchFamily="49" charset="0"/>
+              </a:rPr>
+              <a:t>   </a:t>
+            </a:r>
+          </a:p>
+          <a:p>
+            <a:r>
+              <a:rPr lang="en-US" sz="1600" b="1" dirty="0" smtClean="0">
+                <a:solidFill>
+                  <a:srgbClr val="7F0055"/>
+                </a:solidFill>
+                <a:latin typeface="Consolas" panose="020B0609020204030204" pitchFamily="49" charset="0"/>
+              </a:rPr>
+              <a:t>    probability</a:t>
+            </a:r>
+            <a:r>
+              <a:rPr lang="en-US" sz="1600" b="1" dirty="0">
+                <a:solidFill>
+                  <a:srgbClr val="7F0055"/>
+                </a:solidFill>
+                <a:latin typeface="Consolas" panose="020B0609020204030204" pitchFamily="49" charset="0"/>
+              </a:rPr>
+              <a:t>:</a:t>
+            </a:r>
+            <a:r>
+              <a:rPr lang="en-US" sz="1600" b="1" dirty="0">
+                <a:solidFill>
+                  <a:srgbClr val="000000"/>
+                </a:solidFill>
+                <a:latin typeface="Consolas" panose="020B0609020204030204" pitchFamily="49" charset="0"/>
+              </a:rPr>
+              <a:t> </a:t>
+            </a:r>
+            <a:r>
+              <a:rPr lang="en-US" sz="1600" b="1" dirty="0" smtClean="0">
+                <a:solidFill>
+                  <a:srgbClr val="000000"/>
+                </a:solidFill>
+                <a:latin typeface="Consolas" panose="020B0609020204030204" pitchFamily="49" charset="0"/>
+              </a:rPr>
+              <a:t>1.0E-5 </a:t>
+            </a:r>
+            <a:r>
+              <a:rPr lang="en-US" sz="1600" b="1" dirty="0">
+                <a:solidFill>
+                  <a:srgbClr val="7F0055"/>
+                </a:solidFill>
+                <a:latin typeface="Consolas" panose="020B0609020204030204" pitchFamily="49" charset="0"/>
+              </a:rPr>
+              <a:t>;</a:t>
+            </a:r>
+          </a:p>
+          <a:p>
+            <a:r>
+              <a:rPr lang="en-US" sz="1600" b="1" dirty="0" smtClean="0">
+                <a:solidFill>
+                  <a:srgbClr val="7F0055"/>
+                </a:solidFill>
+                <a:latin typeface="Consolas" panose="020B0609020204030204" pitchFamily="49" charset="0"/>
+              </a:rPr>
+              <a:t>    duration</a:t>
+            </a:r>
+            <a:r>
+              <a:rPr lang="en-US" sz="1600" b="1" dirty="0">
+                <a:solidFill>
+                  <a:srgbClr val="7F0055"/>
+                </a:solidFill>
+                <a:latin typeface="Consolas" panose="020B0609020204030204" pitchFamily="49" charset="0"/>
+              </a:rPr>
+              <a:t>:</a:t>
+            </a:r>
+            <a:r>
+              <a:rPr lang="en-US" sz="1600" b="1" dirty="0">
+                <a:solidFill>
+                  <a:srgbClr val="000000"/>
+                </a:solidFill>
+                <a:latin typeface="Consolas" panose="020B0609020204030204" pitchFamily="49" charset="0"/>
+              </a:rPr>
+              <a:t> </a:t>
+            </a:r>
+            <a:r>
+              <a:rPr lang="en-US" sz="1600" b="1" dirty="0">
+                <a:solidFill>
+                  <a:srgbClr val="7F0055"/>
+                </a:solidFill>
+                <a:latin typeface="Consolas" panose="020B0609020204030204" pitchFamily="49" charset="0"/>
+              </a:rPr>
+              <a:t>permanent;</a:t>
+            </a:r>
+          </a:p>
+          <a:p>
+            <a:r>
+              <a:rPr lang="en-US" sz="1600" b="1" dirty="0">
+                <a:solidFill>
+                  <a:srgbClr val="7F0055"/>
+                </a:solidFill>
+                <a:latin typeface="Consolas" panose="020B0609020204030204" pitchFamily="49" charset="0"/>
+              </a:rPr>
+              <a:t>}</a:t>
+            </a:r>
+          </a:p>
+          <a:p>
+            <a:r>
+              <a:rPr lang="en-US" sz="1600" dirty="0">
+                <a:solidFill>
+                  <a:srgbClr val="000000"/>
+                </a:solidFill>
+                <a:latin typeface="Consolas" panose="020B0609020204030204" pitchFamily="49" charset="0"/>
+              </a:rPr>
+              <a:t>**};</a:t>
+            </a:r>
+          </a:p>
+        </p:txBody>
+      </p:sp>
+    </p:spTree>
+    <p:extLst>
+      <p:ext uri="{BB962C8B-B14F-4D97-AF65-F5344CB8AC3E}">
+        <p14:creationId xmlns:p14="http://schemas.microsoft.com/office/powerpoint/2010/main" val="1898855266"/>
       </p:ext>
     </p:extLst>
   </p:cSld>
@@ -5044,7 +5673,7 @@
   <a:extraClrSchemeLst/>
   <a:extLst>
     <a:ext uri="{05A4C25C-085E-4340-85A3-A5531E510DB2}">
-      <thm15:themeFamily xmlns:thm15="http://schemas.microsoft.com/office/thememl/2012/main" xmlns="" name="Office Theme" id="{62F939B6-93AF-4DB8-9C6B-D6C7DFDC589F}" vid="{4A3C46E8-61CC-4603-A589-7422A47A8E4A}"/>
+      <thm15:themeFamily xmlns:thm15="http://schemas.microsoft.com/office/thememl/2012/main" name="Office Theme" id="{62F939B6-93AF-4DB8-9C6B-D6C7DFDC589F}" vid="{4A3C46E8-61CC-4603-A589-7422A47A8E4A}"/>
     </a:ext>
   </a:extLst>
 </a:theme>

</xml_diff>